<commit_message>
Added links and addressed comments
</commit_message>
<xml_diff>
--- a/docs/img/structured-streaming.pptx
+++ b/docs/img/structured-streaming.pptx
@@ -3859,8 +3859,8 @@
         </p:nvSpPr>
         <p:spPr>
           <a:xfrm>
-            <a:off x="6999986" y="1859976"/>
-            <a:ext cx="2215671" cy="1569660"/>
+            <a:off x="6938271" y="1859976"/>
+            <a:ext cx="2339102" cy="1569660"/>
           </a:xfrm>
           <a:prstGeom prst="rect">
             <a:avLst/>
@@ -3932,12 +3932,28 @@
           <a:p>
             <a:pPr algn="ctr"/>
             <a:r>
+              <a:rPr lang="en-US" smtClean="0">
+                <a:latin typeface="Source Sans Pro Light" charset="0"/>
+                <a:ea typeface="Source Sans Pro Light" charset="0"/>
+                <a:cs typeface="Source Sans Pro Light" charset="0"/>
+              </a:rPr>
+              <a:t>to </a:t>
+            </a:r>
+            <a:r>
+              <a:rPr lang="en-US" smtClean="0">
+                <a:latin typeface="Source Sans Pro Light" charset="0"/>
+                <a:ea typeface="Source Sans Pro Light" charset="0"/>
+                <a:cs typeface="Source Sans Pro Light" charset="0"/>
+              </a:rPr>
+              <a:t>an </a:t>
+            </a:r>
+            <a:r>
               <a:rPr lang="en-US" dirty="0" smtClean="0">
                 <a:latin typeface="Source Sans Pro Light" charset="0"/>
                 <a:ea typeface="Source Sans Pro Light" charset="0"/>
                 <a:cs typeface="Source Sans Pro Light" charset="0"/>
               </a:rPr>
-              <a:t>to a unbounded table</a:t>
+              <a:t>unbounded table</a:t>
             </a:r>
             <a:endParaRPr lang="en-US" dirty="0">
               <a:latin typeface="Source Sans Pro Light" charset="0"/>

</xml_diff>

<commit_message>
[SPARK-16256][DOCS] Fix window operation diagram
Author: Tathagata Das <tathagata.das1565@gmail.com>

Closes #14001 from tdas/SPARK-16256-2.

(cherry picked from commit 5d00a7bc19ddeb1b5247733b55095a03ee7b1a30)
Signed-off-by: Tathagata Das <tathagata.das1565@gmail.com>
</commit_message>
<xml_diff>
--- a/docs/img/structured-streaming.pptx
+++ b/docs/img/structured-streaming.pptx
@@ -247,7 +247,7 @@
           <a:p>
             <a:fld id="{66B02B72-AB41-C343-9175-0553C21C4E77}" type="datetimeFigureOut">
               <a:rPr lang="en-US" smtClean="0"/>
-              <a:t>6/28/16</a:t>
+              <a:t>6/30/16</a:t>
             </a:fld>
             <a:endParaRPr lang="en-US"/>
           </a:p>
@@ -417,7 +417,7 @@
           <a:p>
             <a:fld id="{66B02B72-AB41-C343-9175-0553C21C4E77}" type="datetimeFigureOut">
               <a:rPr lang="en-US" smtClean="0"/>
-              <a:t>6/28/16</a:t>
+              <a:t>6/30/16</a:t>
             </a:fld>
             <a:endParaRPr lang="en-US"/>
           </a:p>
@@ -597,7 +597,7 @@
           <a:p>
             <a:fld id="{66B02B72-AB41-C343-9175-0553C21C4E77}" type="datetimeFigureOut">
               <a:rPr lang="en-US" smtClean="0"/>
-              <a:t>6/28/16</a:t>
+              <a:t>6/30/16</a:t>
             </a:fld>
             <a:endParaRPr lang="en-US"/>
           </a:p>
@@ -767,7 +767,7 @@
           <a:p>
             <a:fld id="{66B02B72-AB41-C343-9175-0553C21C4E77}" type="datetimeFigureOut">
               <a:rPr lang="en-US" smtClean="0"/>
-              <a:t>6/28/16</a:t>
+              <a:t>6/30/16</a:t>
             </a:fld>
             <a:endParaRPr lang="en-US"/>
           </a:p>
@@ -1013,7 +1013,7 @@
           <a:p>
             <a:fld id="{66B02B72-AB41-C343-9175-0553C21C4E77}" type="datetimeFigureOut">
               <a:rPr lang="en-US" smtClean="0"/>
-              <a:t>6/28/16</a:t>
+              <a:t>6/30/16</a:t>
             </a:fld>
             <a:endParaRPr lang="en-US"/>
           </a:p>
@@ -1245,7 +1245,7 @@
           <a:p>
             <a:fld id="{66B02B72-AB41-C343-9175-0553C21C4E77}" type="datetimeFigureOut">
               <a:rPr lang="en-US" smtClean="0"/>
-              <a:t>6/28/16</a:t>
+              <a:t>6/30/16</a:t>
             </a:fld>
             <a:endParaRPr lang="en-US"/>
           </a:p>
@@ -1612,7 +1612,7 @@
           <a:p>
             <a:fld id="{66B02B72-AB41-C343-9175-0553C21C4E77}" type="datetimeFigureOut">
               <a:rPr lang="en-US" smtClean="0"/>
-              <a:t>6/28/16</a:t>
+              <a:t>6/30/16</a:t>
             </a:fld>
             <a:endParaRPr lang="en-US"/>
           </a:p>
@@ -1730,7 +1730,7 @@
           <a:p>
             <a:fld id="{66B02B72-AB41-C343-9175-0553C21C4E77}" type="datetimeFigureOut">
               <a:rPr lang="en-US" smtClean="0"/>
-              <a:t>6/28/16</a:t>
+              <a:t>6/30/16</a:t>
             </a:fld>
             <a:endParaRPr lang="en-US"/>
           </a:p>
@@ -1825,7 +1825,7 @@
           <a:p>
             <a:fld id="{66B02B72-AB41-C343-9175-0553C21C4E77}" type="datetimeFigureOut">
               <a:rPr lang="en-US" smtClean="0"/>
-              <a:t>6/28/16</a:t>
+              <a:t>6/30/16</a:t>
             </a:fld>
             <a:endParaRPr lang="en-US"/>
           </a:p>
@@ -2102,7 +2102,7 @@
           <a:p>
             <a:fld id="{66B02B72-AB41-C343-9175-0553C21C4E77}" type="datetimeFigureOut">
               <a:rPr lang="en-US" smtClean="0"/>
-              <a:t>6/28/16</a:t>
+              <a:t>6/30/16</a:t>
             </a:fld>
             <a:endParaRPr lang="en-US"/>
           </a:p>
@@ -2355,7 +2355,7 @@
           <a:p>
             <a:fld id="{66B02B72-AB41-C343-9175-0553C21C4E77}" type="datetimeFigureOut">
               <a:rPr lang="en-US" smtClean="0"/>
-              <a:t>6/28/16</a:t>
+              <a:t>6/30/16</a:t>
             </a:fld>
             <a:endParaRPr lang="en-US"/>
           </a:p>
@@ -2568,7 +2568,7 @@
           <a:p>
             <a:fld id="{66B02B72-AB41-C343-9175-0553C21C4E77}" type="datetimeFigureOut">
               <a:rPr lang="en-US" smtClean="0"/>
-              <a:t>6/28/16</a:t>
+              <a:t>6/30/16</a:t>
             </a:fld>
             <a:endParaRPr lang="en-US"/>
           </a:p>
@@ -3937,23 +3937,7 @@
                 <a:ea typeface="Source Sans Pro Light" charset="0"/>
                 <a:cs typeface="Source Sans Pro Light" charset="0"/>
               </a:rPr>
-              <a:t>to </a:t>
-            </a:r>
-            <a:r>
-              <a:rPr lang="en-US" dirty="0" smtClean="0">
-                <a:latin typeface="Source Sans Pro Light" charset="0"/>
-                <a:ea typeface="Source Sans Pro Light" charset="0"/>
-                <a:cs typeface="Source Sans Pro Light" charset="0"/>
-              </a:rPr>
-              <a:t>an </a:t>
-            </a:r>
-            <a:r>
-              <a:rPr lang="en-US" dirty="0" smtClean="0">
-                <a:latin typeface="Source Sans Pro Light" charset="0"/>
-                <a:ea typeface="Source Sans Pro Light" charset="0"/>
-                <a:cs typeface="Source Sans Pro Light" charset="0"/>
-              </a:rPr>
-              <a:t>unbounded table</a:t>
+              <a:t>to an unbounded table</a:t>
             </a:r>
             <a:endParaRPr lang="en-US" dirty="0">
               <a:latin typeface="Source Sans Pro Light" charset="0"/>
@@ -8600,7 +8584,7 @@
           <p:nvPr>
             <p:extLst>
               <p:ext uri="{D42A27DB-BD31-4B8C-83A1-F6EECF244321}">
-                <p14:modId xmlns:p14="http://schemas.microsoft.com/office/powerpoint/2010/main" val="867776512"/>
+                <p14:modId xmlns:p14="http://schemas.microsoft.com/office/powerpoint/2010/main" val="230850681"/>
               </p:ext>
             </p:extLst>
           </p:nvPr>
@@ -8736,7 +8720,7 @@
           <p:nvPr>
             <p:extLst>
               <p:ext uri="{D42A27DB-BD31-4B8C-83A1-F6EECF244321}">
-                <p14:modId xmlns:p14="http://schemas.microsoft.com/office/powerpoint/2010/main" val="1158390407"/>
+                <p14:modId xmlns:p14="http://schemas.microsoft.com/office/powerpoint/2010/main" val="1551929085"/>
               </p:ext>
             </p:extLst>
           </p:nvPr>
@@ -8864,7 +8848,7 @@
           <p:nvPr>
             <p:extLst>
               <p:ext uri="{D42A27DB-BD31-4B8C-83A1-F6EECF244321}">
-                <p14:modId xmlns:p14="http://schemas.microsoft.com/office/powerpoint/2010/main" val="2128310394"/>
+                <p14:modId xmlns:p14="http://schemas.microsoft.com/office/powerpoint/2010/main" val="2083238780"/>
               </p:ext>
             </p:extLst>
           </p:nvPr>
@@ -9158,7 +9142,7 @@
           <p:nvPr>
             <p:extLst>
               <p:ext uri="{D42A27DB-BD31-4B8C-83A1-F6EECF244321}">
-                <p14:modId xmlns:p14="http://schemas.microsoft.com/office/powerpoint/2010/main" val="2025167526"/>
+                <p14:modId xmlns:p14="http://schemas.microsoft.com/office/powerpoint/2010/main" val="420794772"/>
               </p:ext>
             </p:extLst>
           </p:nvPr>
@@ -9445,7 +9429,7 @@
           <p:nvPr>
             <p:extLst>
               <p:ext uri="{D42A27DB-BD31-4B8C-83A1-F6EECF244321}">
-                <p14:modId xmlns:p14="http://schemas.microsoft.com/office/powerpoint/2010/main" val="1522288179"/>
+                <p14:modId xmlns:p14="http://schemas.microsoft.com/office/powerpoint/2010/main" val="634083433"/>
               </p:ext>
             </p:extLst>
           </p:nvPr>
@@ -10107,14 +10091,14 @@
           <p:nvPr>
             <p:extLst>
               <p:ext uri="{D42A27DB-BD31-4B8C-83A1-F6EECF244321}">
-                <p14:modId xmlns:p14="http://schemas.microsoft.com/office/powerpoint/2010/main" val="2124737742"/>
+                <p14:modId xmlns:p14="http://schemas.microsoft.com/office/powerpoint/2010/main" val="1226402017"/>
               </p:ext>
             </p:extLst>
           </p:nvPr>
         </p:nvGraphicFramePr>
         <p:xfrm>
           <a:off x="7680011" y="2679002"/>
-          <a:ext cx="1556978" cy="1656970"/>
+          <a:ext cx="1556978" cy="1893680"/>
         </p:xfrm>
         <a:graphic>
           <a:graphicData uri="http://schemas.openxmlformats.org/drawingml/2006/table">
@@ -10539,6 +10523,15 @@
                       <a:headEnd type="none" w="med" len="med"/>
                       <a:tailEnd type="none" w="med" len="med"/>
                     </a:lnL>
+                    <a:lnR w="12700" cap="flat" cmpd="sng" algn="ctr">
+                      <a:solidFill>
+                        <a:schemeClr val="accent6"/>
+                      </a:solidFill>
+                      <a:prstDash val="solid"/>
+                      <a:round/>
+                      <a:headEnd type="none" w="med" len="med"/>
+                      <a:tailEnd type="none" w="med" len="med"/>
+                    </a:lnR>
                     <a:lnT w="28575" cap="flat" cmpd="sng" algn="ctr">
                       <a:solidFill>
                         <a:schemeClr val="accent6"/>
@@ -10548,6 +10541,15 @@
                       <a:headEnd type="none" w="med" len="med"/>
                       <a:tailEnd type="none" w="med" len="med"/>
                     </a:lnT>
+                    <a:lnB w="12700" cap="flat" cmpd="sng" algn="ctr">
+                      <a:solidFill>
+                        <a:schemeClr val="accent6"/>
+                      </a:solidFill>
+                      <a:prstDash val="solid"/>
+                      <a:round/>
+                      <a:headEnd type="none" w="med" len="med"/>
+                      <a:tailEnd type="none" w="med" len="med"/>
+                    </a:lnB>
                   </a:tcPr>
                 </a:tc>
                 <a:tc>
@@ -10572,6 +10574,24 @@
                     </a:p>
                   </a:txBody>
                   <a:tcPr marL="53830" marR="53830" marT="26915" marB="26915">
+                    <a:lnL w="12700" cap="flat" cmpd="sng" algn="ctr">
+                      <a:solidFill>
+                        <a:schemeClr val="accent6"/>
+                      </a:solidFill>
+                      <a:prstDash val="solid"/>
+                      <a:round/>
+                      <a:headEnd type="none" w="med" len="med"/>
+                      <a:tailEnd type="none" w="med" len="med"/>
+                    </a:lnL>
+                    <a:lnR w="12700" cap="flat" cmpd="sng" algn="ctr">
+                      <a:solidFill>
+                        <a:schemeClr val="accent6"/>
+                      </a:solidFill>
+                      <a:prstDash val="solid"/>
+                      <a:round/>
+                      <a:headEnd type="none" w="med" len="med"/>
+                      <a:tailEnd type="none" w="med" len="med"/>
+                    </a:lnR>
                     <a:lnT w="28575" cap="flat" cmpd="sng" algn="ctr">
                       <a:solidFill>
                         <a:schemeClr val="accent6"/>
@@ -10581,6 +10601,15 @@
                       <a:headEnd type="none" w="med" len="med"/>
                       <a:tailEnd type="none" w="med" len="med"/>
                     </a:lnT>
+                    <a:lnB w="12700" cap="flat" cmpd="sng" algn="ctr">
+                      <a:solidFill>
+                        <a:schemeClr val="accent6"/>
+                      </a:solidFill>
+                      <a:prstDash val="solid"/>
+                      <a:round/>
+                      <a:headEnd type="none" w="med" len="med"/>
+                      <a:tailEnd type="none" w="med" len="med"/>
+                    </a:lnB>
                   </a:tcPr>
                 </a:tc>
                 <a:tc>
@@ -10605,6 +10634,15 @@
                     </a:p>
                   </a:txBody>
                   <a:tcPr marL="53830" marR="53830" marT="26915" marB="26915">
+                    <a:lnL w="12700" cap="flat" cmpd="sng" algn="ctr">
+                      <a:solidFill>
+                        <a:schemeClr val="accent6"/>
+                      </a:solidFill>
+                      <a:prstDash val="solid"/>
+                      <a:round/>
+                      <a:headEnd type="none" w="med" len="med"/>
+                      <a:tailEnd type="none" w="med" len="med"/>
+                    </a:lnL>
                     <a:lnR w="28575" cap="flat" cmpd="sng" algn="ctr">
                       <a:solidFill>
                         <a:schemeClr val="accent6"/>
@@ -10623,6 +10661,15 @@
                       <a:headEnd type="none" w="med" len="med"/>
                       <a:tailEnd type="none" w="med" len="med"/>
                     </a:lnT>
+                    <a:lnB w="12700" cap="flat" cmpd="sng" algn="ctr">
+                      <a:solidFill>
+                        <a:schemeClr val="accent6"/>
+                      </a:solidFill>
+                      <a:prstDash val="solid"/>
+                      <a:round/>
+                      <a:headEnd type="none" w="med" len="med"/>
+                      <a:tailEnd type="none" w="med" len="med"/>
+                    </a:lnB>
                   </a:tcPr>
                 </a:tc>
               </a:tr>
@@ -10669,6 +10716,217 @@
                       <a:headEnd type="none" w="med" len="med"/>
                       <a:tailEnd type="none" w="med" len="med"/>
                     </a:lnL>
+                    <a:lnR w="12700" cap="flat" cmpd="sng" algn="ctr">
+                      <a:solidFill>
+                        <a:schemeClr val="accent6"/>
+                      </a:solidFill>
+                      <a:prstDash val="solid"/>
+                      <a:round/>
+                      <a:headEnd type="none" w="med" len="med"/>
+                      <a:tailEnd type="none" w="med" len="med"/>
+                    </a:lnR>
+                    <a:lnT w="12700" cap="flat" cmpd="sng" algn="ctr">
+                      <a:solidFill>
+                        <a:schemeClr val="accent6"/>
+                      </a:solidFill>
+                      <a:prstDash val="solid"/>
+                      <a:round/>
+                      <a:headEnd type="none" w="med" len="med"/>
+                      <a:tailEnd type="none" w="med" len="med"/>
+                    </a:lnT>
+                    <a:lnB w="12700" cap="flat" cmpd="sng" algn="ctr">
+                      <a:solidFill>
+                        <a:schemeClr val="accent6"/>
+                      </a:solidFill>
+                      <a:prstDash val="solid"/>
+                      <a:round/>
+                      <a:headEnd type="none" w="med" len="med"/>
+                      <a:tailEnd type="none" w="med" len="med"/>
+                    </a:lnB>
+                  </a:tcPr>
+                </a:tc>
+                <a:tc>
+                  <a:txBody>
+                    <a:bodyPr/>
+                    <a:lstStyle/>
+                    <a:p>
+                      <a:pPr algn="ctr"/>
+                      <a:r>
+                        <a:rPr lang="en-US" sz="1200" b="0" i="0" dirty="0" smtClean="0">
+                          <a:latin typeface="Source Sans Pro Light" charset="0"/>
+                          <a:ea typeface="Source Sans Pro Light" charset="0"/>
+                          <a:cs typeface="Source Sans Pro Light" charset="0"/>
+                        </a:rPr>
+                        <a:t>owl</a:t>
+                      </a:r>
+                      <a:endParaRPr lang="en-US" sz="1200" b="0" i="0" dirty="0">
+                        <a:latin typeface="Source Sans Pro Light" charset="0"/>
+                        <a:ea typeface="Source Sans Pro Light" charset="0"/>
+                        <a:cs typeface="Source Sans Pro Light" charset="0"/>
+                      </a:endParaRPr>
+                    </a:p>
+                  </a:txBody>
+                  <a:tcPr marL="53830" marR="53830" marT="26915" marB="26915">
+                    <a:lnL w="12700" cap="flat" cmpd="sng" algn="ctr">
+                      <a:solidFill>
+                        <a:schemeClr val="accent6"/>
+                      </a:solidFill>
+                      <a:prstDash val="solid"/>
+                      <a:round/>
+                      <a:headEnd type="none" w="med" len="med"/>
+                      <a:tailEnd type="none" w="med" len="med"/>
+                    </a:lnL>
+                    <a:lnR w="12700" cap="flat" cmpd="sng" algn="ctr">
+                      <a:solidFill>
+                        <a:schemeClr val="accent6"/>
+                      </a:solidFill>
+                      <a:prstDash val="solid"/>
+                      <a:round/>
+                      <a:headEnd type="none" w="med" len="med"/>
+                      <a:tailEnd type="none" w="med" len="med"/>
+                    </a:lnR>
+                    <a:lnT w="12700" cap="flat" cmpd="sng" algn="ctr">
+                      <a:solidFill>
+                        <a:schemeClr val="accent6"/>
+                      </a:solidFill>
+                      <a:prstDash val="solid"/>
+                      <a:round/>
+                      <a:headEnd type="none" w="med" len="med"/>
+                      <a:tailEnd type="none" w="med" len="med"/>
+                    </a:lnT>
+                    <a:lnB w="12700" cap="flat" cmpd="sng" algn="ctr">
+                      <a:solidFill>
+                        <a:schemeClr val="accent6"/>
+                      </a:solidFill>
+                      <a:prstDash val="solid"/>
+                      <a:round/>
+                      <a:headEnd type="none" w="med" len="med"/>
+                      <a:tailEnd type="none" w="med" len="med"/>
+                    </a:lnB>
+                  </a:tcPr>
+                </a:tc>
+                <a:tc>
+                  <a:txBody>
+                    <a:bodyPr/>
+                    <a:lstStyle/>
+                    <a:p>
+                      <a:pPr algn="ctr"/>
+                      <a:r>
+                        <a:rPr lang="en-US" sz="1200" b="0" i="0" dirty="0" smtClean="0">
+                          <a:latin typeface="Source Sans Pro Light" charset="0"/>
+                          <a:ea typeface="Source Sans Pro Light" charset="0"/>
+                          <a:cs typeface="Source Sans Pro Light" charset="0"/>
+                        </a:rPr>
+                        <a:t>2</a:t>
+                      </a:r>
+                      <a:endParaRPr lang="en-US" sz="1200" b="0" i="0" dirty="0">
+                        <a:latin typeface="Source Sans Pro Light" charset="0"/>
+                        <a:ea typeface="Source Sans Pro Light" charset="0"/>
+                        <a:cs typeface="Source Sans Pro Light" charset="0"/>
+                      </a:endParaRPr>
+                    </a:p>
+                  </a:txBody>
+                  <a:tcPr marL="53830" marR="53830" marT="26915" marB="26915">
+                    <a:lnL w="12700" cap="flat" cmpd="sng" algn="ctr">
+                      <a:solidFill>
+                        <a:schemeClr val="accent6"/>
+                      </a:solidFill>
+                      <a:prstDash val="solid"/>
+                      <a:round/>
+                      <a:headEnd type="none" w="med" len="med"/>
+                      <a:tailEnd type="none" w="med" len="med"/>
+                    </a:lnL>
+                    <a:lnR w="28575" cap="flat" cmpd="sng" algn="ctr">
+                      <a:solidFill>
+                        <a:schemeClr val="accent6"/>
+                      </a:solidFill>
+                      <a:prstDash val="solid"/>
+                      <a:round/>
+                      <a:headEnd type="none" w="med" len="med"/>
+                      <a:tailEnd type="none" w="med" len="med"/>
+                    </a:lnR>
+                    <a:lnT w="12700" cap="flat" cmpd="sng" algn="ctr">
+                      <a:solidFill>
+                        <a:schemeClr val="accent6"/>
+                      </a:solidFill>
+                      <a:prstDash val="solid"/>
+                      <a:round/>
+                      <a:headEnd type="none" w="med" len="med"/>
+                      <a:tailEnd type="none" w="med" len="med"/>
+                    </a:lnT>
+                    <a:lnB w="12700" cap="flat" cmpd="sng" algn="ctr">
+                      <a:solidFill>
+                        <a:schemeClr val="accent6"/>
+                      </a:solidFill>
+                      <a:prstDash val="solid"/>
+                      <a:round/>
+                      <a:headEnd type="none" w="med" len="med"/>
+                      <a:tailEnd type="none" w="med" len="med"/>
+                    </a:lnB>
+                  </a:tcPr>
+                </a:tc>
+              </a:tr>
+              <a:tr h="230076">
+                <a:tc>
+                  <a:txBody>
+                    <a:bodyPr/>
+                    <a:lstStyle/>
+                    <a:p>
+                      <a:pPr marL="0" marR="0" indent="0" algn="ctr" defTabSz="914400" rtl="0" eaLnBrk="1" fontAlgn="auto" latinLnBrk="0" hangingPunct="1">
+                        <a:lnSpc>
+                          <a:spcPct val="100000"/>
+                        </a:lnSpc>
+                        <a:spcBef>
+                          <a:spcPts val="0"/>
+                        </a:spcBef>
+                        <a:spcAft>
+                          <a:spcPts val="0"/>
+                        </a:spcAft>
+                        <a:buClrTx/>
+                        <a:buSzTx/>
+                        <a:buFontTx/>
+                        <a:buNone/>
+                        <a:tabLst/>
+                        <a:defRPr/>
+                      </a:pPr>
+                      <a:r>
+                        <a:rPr lang="en-US" sz="1200" b="0" i="0" dirty="0" smtClean="0">
+                          <a:latin typeface="Source Sans Pro Light" charset="0"/>
+                          <a:ea typeface="Source Sans Pro Light" charset="0"/>
+                          <a:cs typeface="Source Sans Pro Light" charset="0"/>
+                        </a:rPr>
+                        <a:t>12:05 - 12:15</a:t>
+                      </a:r>
+                    </a:p>
+                  </a:txBody>
+                  <a:tcPr marL="53830" marR="53830" marT="26915" marB="26915">
+                    <a:lnL w="28575" cap="flat" cmpd="sng" algn="ctr">
+                      <a:solidFill>
+                        <a:schemeClr val="accent6"/>
+                      </a:solidFill>
+                      <a:prstDash val="solid"/>
+                      <a:round/>
+                      <a:headEnd type="none" w="med" len="med"/>
+                      <a:tailEnd type="none" w="med" len="med"/>
+                    </a:lnL>
+                    <a:lnR w="12700" cap="flat" cmpd="sng" algn="ctr">
+                      <a:solidFill>
+                        <a:schemeClr val="accent6"/>
+                      </a:solidFill>
+                      <a:prstDash val="solid"/>
+                      <a:round/>
+                      <a:headEnd type="none" w="med" len="med"/>
+                      <a:tailEnd type="none" w="med" len="med"/>
+                    </a:lnR>
+                    <a:lnT w="12700" cap="flat" cmpd="sng" algn="ctr">
+                      <a:solidFill>
+                        <a:schemeClr val="accent6"/>
+                      </a:solidFill>
+                      <a:prstDash val="solid"/>
+                      <a:round/>
+                      <a:headEnd type="none" w="med" len="med"/>
+                      <a:tailEnd type="none" w="med" len="med"/>
+                    </a:lnT>
                     <a:lnB w="28575" cap="flat" cmpd="sng" algn="ctr">
                       <a:solidFill>
                         <a:schemeClr val="accent6"/>
@@ -10692,7 +10950,7 @@
                           <a:ea typeface="Source Sans Pro Light" charset="0"/>
                           <a:cs typeface="Source Sans Pro Light" charset="0"/>
                         </a:rPr>
-                        <a:t>owl</a:t>
+                        <a:t>dog</a:t>
                       </a:r>
                       <a:endParaRPr lang="en-US" sz="1200" b="0" i="0" dirty="0">
                         <a:latin typeface="Source Sans Pro Light" charset="0"/>
@@ -10702,6 +10960,33 @@
                     </a:p>
                   </a:txBody>
                   <a:tcPr marL="53830" marR="53830" marT="26915" marB="26915">
+                    <a:lnL w="12700" cap="flat" cmpd="sng" algn="ctr">
+                      <a:solidFill>
+                        <a:schemeClr val="accent6"/>
+                      </a:solidFill>
+                      <a:prstDash val="solid"/>
+                      <a:round/>
+                      <a:headEnd type="none" w="med" len="med"/>
+                      <a:tailEnd type="none" w="med" len="med"/>
+                    </a:lnL>
+                    <a:lnR w="12700" cap="flat" cmpd="sng" algn="ctr">
+                      <a:solidFill>
+                        <a:schemeClr val="accent6"/>
+                      </a:solidFill>
+                      <a:prstDash val="solid"/>
+                      <a:round/>
+                      <a:headEnd type="none" w="med" len="med"/>
+                      <a:tailEnd type="none" w="med" len="med"/>
+                    </a:lnR>
+                    <a:lnT w="12700" cap="flat" cmpd="sng" algn="ctr">
+                      <a:solidFill>
+                        <a:schemeClr val="accent6"/>
+                      </a:solidFill>
+                      <a:prstDash val="solid"/>
+                      <a:round/>
+                      <a:headEnd type="none" w="med" len="med"/>
+                      <a:tailEnd type="none" w="med" len="med"/>
+                    </a:lnT>
                     <a:lnB w="28575" cap="flat" cmpd="sng" algn="ctr">
                       <a:solidFill>
                         <a:schemeClr val="accent6"/>
@@ -10725,7 +11010,7 @@
                           <a:ea typeface="Source Sans Pro Light" charset="0"/>
                           <a:cs typeface="Source Sans Pro Light" charset="0"/>
                         </a:rPr>
-                        <a:t>2</a:t>
+                        <a:t>1</a:t>
                       </a:r>
                       <a:endParaRPr lang="en-US" sz="1200" b="0" i="0" dirty="0">
                         <a:latin typeface="Source Sans Pro Light" charset="0"/>
@@ -10735,6 +11020,15 @@
                     </a:p>
                   </a:txBody>
                   <a:tcPr marL="53830" marR="53830" marT="26915" marB="26915">
+                    <a:lnL w="12700" cap="flat" cmpd="sng" algn="ctr">
+                      <a:solidFill>
+                        <a:schemeClr val="accent6"/>
+                      </a:solidFill>
+                      <a:prstDash val="solid"/>
+                      <a:round/>
+                      <a:headEnd type="none" w="med" len="med"/>
+                      <a:tailEnd type="none" w="med" len="med"/>
+                    </a:lnL>
                     <a:lnR w="28575" cap="flat" cmpd="sng" algn="ctr">
                       <a:solidFill>
                         <a:schemeClr val="accent6"/>
@@ -10744,6 +11038,15 @@
                       <a:headEnd type="none" w="med" len="med"/>
                       <a:tailEnd type="none" w="med" len="med"/>
                     </a:lnR>
+                    <a:lnT w="12700" cap="flat" cmpd="sng" algn="ctr">
+                      <a:solidFill>
+                        <a:schemeClr val="accent6"/>
+                      </a:solidFill>
+                      <a:prstDash val="solid"/>
+                      <a:round/>
+                      <a:headEnd type="none" w="med" len="med"/>
+                      <a:tailEnd type="none" w="med" len="med"/>
+                    </a:lnT>
                     <a:lnB w="28575" cap="flat" cmpd="sng" algn="ctr">
                       <a:solidFill>
                         <a:schemeClr val="accent6"/>
@@ -11326,7 +11629,7 @@
         </p:nvSpPr>
         <p:spPr>
           <a:xfrm>
-            <a:off x="7174334" y="4443989"/>
+            <a:off x="7174334" y="4637716"/>
             <a:ext cx="2568332" cy="523220"/>
           </a:xfrm>
           <a:prstGeom prst="rect">
@@ -11749,7 +12052,7 @@
           <p:nvPr>
             <p:extLst>
               <p:ext uri="{D42A27DB-BD31-4B8C-83A1-F6EECF244321}">
-                <p14:modId xmlns:p14="http://schemas.microsoft.com/office/powerpoint/2010/main" val="69612792"/>
+                <p14:modId xmlns:p14="http://schemas.microsoft.com/office/powerpoint/2010/main" val="1482832657"/>
               </p:ext>
             </p:extLst>
           </p:nvPr>
@@ -11885,7 +12188,7 @@
           <p:nvPr>
             <p:extLst>
               <p:ext uri="{D42A27DB-BD31-4B8C-83A1-F6EECF244321}">
-                <p14:modId xmlns:p14="http://schemas.microsoft.com/office/powerpoint/2010/main" val="1751091176"/>
+                <p14:modId xmlns:p14="http://schemas.microsoft.com/office/powerpoint/2010/main" val="420742764"/>
               </p:ext>
             </p:extLst>
           </p:nvPr>
@@ -12025,7 +12328,7 @@
           <p:nvPr>
             <p:extLst>
               <p:ext uri="{D42A27DB-BD31-4B8C-83A1-F6EECF244321}">
-                <p14:modId xmlns:p14="http://schemas.microsoft.com/office/powerpoint/2010/main" val="1473496544"/>
+                <p14:modId xmlns:p14="http://schemas.microsoft.com/office/powerpoint/2010/main" val="1907468624"/>
               </p:ext>
             </p:extLst>
           </p:nvPr>
@@ -12319,7 +12622,7 @@
           <p:nvPr>
             <p:extLst>
               <p:ext uri="{D42A27DB-BD31-4B8C-83A1-F6EECF244321}">
-                <p14:modId xmlns:p14="http://schemas.microsoft.com/office/powerpoint/2010/main" val="274997804"/>
+                <p14:modId xmlns:p14="http://schemas.microsoft.com/office/powerpoint/2010/main" val="1189281152"/>
               </p:ext>
             </p:extLst>
           </p:nvPr>
@@ -12606,7 +12909,7 @@
           <p:nvPr>
             <p:extLst>
               <p:ext uri="{D42A27DB-BD31-4B8C-83A1-F6EECF244321}">
-                <p14:modId xmlns:p14="http://schemas.microsoft.com/office/powerpoint/2010/main" val="503283484"/>
+                <p14:modId xmlns:p14="http://schemas.microsoft.com/office/powerpoint/2010/main" val="1618019035"/>
               </p:ext>
             </p:extLst>
           </p:nvPr>
@@ -13268,7 +13571,7 @@
           <p:nvPr>
             <p:extLst>
               <p:ext uri="{D42A27DB-BD31-4B8C-83A1-F6EECF244321}">
-                <p14:modId xmlns:p14="http://schemas.microsoft.com/office/powerpoint/2010/main" val="1894913702"/>
+                <p14:modId xmlns:p14="http://schemas.microsoft.com/office/powerpoint/2010/main" val="460499284"/>
               </p:ext>
             </p:extLst>
           </p:nvPr>
@@ -14301,8 +14604,8 @@
         </p:nvSpPr>
         <p:spPr>
           <a:xfrm>
-            <a:off x="7006019" y="4159443"/>
-            <a:ext cx="2904962" cy="584775"/>
+            <a:off x="7179144" y="4159443"/>
+            <a:ext cx="2558714" cy="584775"/>
           </a:xfrm>
           <a:prstGeom prst="rect">
             <a:avLst/>
@@ -14335,11 +14638,44 @@
                 <a:ea typeface="Source Sans Pro Light" charset="0"/>
                 <a:cs typeface="Source Sans Pro Light" charset="0"/>
               </a:rPr>
-              <a:t>ounts incremented for windows</a:t>
+              <a:t>ounts incremented </a:t>
+            </a:r>
+            <a:r>
+              <a:rPr lang="en-US" sz="1600" b="0" i="0" dirty="0" smtClean="0">
+                <a:solidFill>
+                  <a:srgbClr val="C00000"/>
+                </a:solidFill>
+                <a:latin typeface="Source Sans Pro Light" charset="0"/>
+                <a:ea typeface="Source Sans Pro Light" charset="0"/>
+                <a:cs typeface="Source Sans Pro Light" charset="0"/>
+              </a:rPr>
+              <a:t>only for </a:t>
             </a:r>
           </a:p>
           <a:p>
             <a:pPr algn="ctr"/>
+            <a:r>
+              <a:rPr lang="en-US" sz="1600" dirty="0">
+                <a:solidFill>
+                  <a:srgbClr val="C00000"/>
+                </a:solidFill>
+                <a:latin typeface="Source Sans Pro Light" charset="0"/>
+                <a:ea typeface="Source Sans Pro Light" charset="0"/>
+                <a:cs typeface="Source Sans Pro Light" charset="0"/>
+              </a:rPr>
+              <a:t>w</a:t>
+            </a:r>
+            <a:r>
+              <a:rPr lang="en-US" sz="1600" b="0" i="0" dirty="0" smtClean="0">
+                <a:solidFill>
+                  <a:srgbClr val="C00000"/>
+                </a:solidFill>
+                <a:latin typeface="Source Sans Pro Light" charset="0"/>
+                <a:ea typeface="Source Sans Pro Light" charset="0"/>
+                <a:cs typeface="Source Sans Pro Light" charset="0"/>
+              </a:rPr>
+              <a:t>indow </a:t>
+            </a:r>
             <a:r>
               <a:rPr lang="en-US" sz="1600" dirty="0" smtClean="0">
                 <a:solidFill>
@@ -14349,7 +14685,29 @@
                 <a:ea typeface="Source Sans Pro Light" charset="0"/>
                 <a:cs typeface="Source Sans Pro Light" charset="0"/>
               </a:rPr>
-              <a:t>12:00 - 12:10 for late data</a:t>
+              <a:t>12:00 </a:t>
+            </a:r>
+            <a:r>
+              <a:rPr lang="en-US" sz="1600" dirty="0" smtClean="0">
+                <a:solidFill>
+                  <a:srgbClr val="C00000"/>
+                </a:solidFill>
+                <a:latin typeface="Source Sans Pro Light" charset="0"/>
+                <a:ea typeface="Source Sans Pro Light" charset="0"/>
+                <a:cs typeface="Source Sans Pro Light" charset="0"/>
+              </a:rPr>
+              <a:t>- </a:t>
+            </a:r>
+            <a:r>
+              <a:rPr lang="en-US" sz="1600" dirty="0" smtClean="0">
+                <a:solidFill>
+                  <a:srgbClr val="C00000"/>
+                </a:solidFill>
+                <a:latin typeface="Source Sans Pro Light" charset="0"/>
+                <a:ea typeface="Source Sans Pro Light" charset="0"/>
+                <a:cs typeface="Source Sans Pro Light" charset="0"/>
+              </a:rPr>
+              <a:t>12:10</a:t>
             </a:r>
             <a:endParaRPr lang="en-US" sz="1600" b="0" i="0" dirty="0">
               <a:solidFill>
@@ -14572,18 +14930,7 @@
                 <a:ea typeface="Source Sans Pro Light" charset="0"/>
                 <a:cs typeface="Source Sans Pro Light" charset="0"/>
               </a:rPr>
-              <a:t>late </a:t>
-            </a:r>
-            <a:r>
-              <a:rPr lang="en-US" sz="1600" dirty="0" smtClean="0">
-                <a:solidFill>
-                  <a:srgbClr val="C00000"/>
-                </a:solidFill>
-                <a:latin typeface="Source Sans Pro Light" charset="0"/>
-                <a:ea typeface="Source Sans Pro Light" charset="0"/>
-                <a:cs typeface="Source Sans Pro Light" charset="0"/>
-              </a:rPr>
-              <a:t>data that was </a:t>
+              <a:t>late data that was </a:t>
             </a:r>
             <a:r>
               <a:rPr lang="en-US" sz="1600" smtClean="0">

</xml_diff>

<commit_message>
Addressed comments and added source/sink options
</commit_message>
<xml_diff>
--- a/docs/img/structured-streaming.pptx
+++ b/docs/img/structured-streaming.pptx
@@ -203,7 +203,7 @@
           <a:p>
             <a:fld id="{7E9395DA-6BB2-B94A-994B-4124BCB00D60}" type="datetimeFigureOut">
               <a:rPr lang="en-US" smtClean="0"/>
-              <a:t>1/3/17</a:t>
+              <a:t>1/4/17</a:t>
             </a:fld>
             <a:endParaRPr lang="en-US"/>
           </a:p>
@@ -602,7 +602,7 @@
           <a:p>
             <a:fld id="{66B02B72-AB41-C343-9175-0553C21C4E77}" type="datetimeFigureOut">
               <a:rPr lang="en-US" smtClean="0"/>
-              <a:t>1/3/17</a:t>
+              <a:t>1/4/17</a:t>
             </a:fld>
             <a:endParaRPr lang="en-US"/>
           </a:p>
@@ -772,7 +772,7 @@
           <a:p>
             <a:fld id="{66B02B72-AB41-C343-9175-0553C21C4E77}" type="datetimeFigureOut">
               <a:rPr lang="en-US" smtClean="0"/>
-              <a:t>1/3/17</a:t>
+              <a:t>1/4/17</a:t>
             </a:fld>
             <a:endParaRPr lang="en-US"/>
           </a:p>
@@ -952,7 +952,7 @@
           <a:p>
             <a:fld id="{66B02B72-AB41-C343-9175-0553C21C4E77}" type="datetimeFigureOut">
               <a:rPr lang="en-US" smtClean="0"/>
-              <a:t>1/3/17</a:t>
+              <a:t>1/4/17</a:t>
             </a:fld>
             <a:endParaRPr lang="en-US"/>
           </a:p>
@@ -1122,7 +1122,7 @@
           <a:p>
             <a:fld id="{66B02B72-AB41-C343-9175-0553C21C4E77}" type="datetimeFigureOut">
               <a:rPr lang="en-US" smtClean="0"/>
-              <a:t>1/3/17</a:t>
+              <a:t>1/4/17</a:t>
             </a:fld>
             <a:endParaRPr lang="en-US"/>
           </a:p>
@@ -1368,7 +1368,7 @@
           <a:p>
             <a:fld id="{66B02B72-AB41-C343-9175-0553C21C4E77}" type="datetimeFigureOut">
               <a:rPr lang="en-US" smtClean="0"/>
-              <a:t>1/3/17</a:t>
+              <a:t>1/4/17</a:t>
             </a:fld>
             <a:endParaRPr lang="en-US"/>
           </a:p>
@@ -1600,7 +1600,7 @@
           <a:p>
             <a:fld id="{66B02B72-AB41-C343-9175-0553C21C4E77}" type="datetimeFigureOut">
               <a:rPr lang="en-US" smtClean="0"/>
-              <a:t>1/3/17</a:t>
+              <a:t>1/4/17</a:t>
             </a:fld>
             <a:endParaRPr lang="en-US"/>
           </a:p>
@@ -1967,7 +1967,7 @@
           <a:p>
             <a:fld id="{66B02B72-AB41-C343-9175-0553C21C4E77}" type="datetimeFigureOut">
               <a:rPr lang="en-US" smtClean="0"/>
-              <a:t>1/3/17</a:t>
+              <a:t>1/4/17</a:t>
             </a:fld>
             <a:endParaRPr lang="en-US"/>
           </a:p>
@@ -2085,7 +2085,7 @@
           <a:p>
             <a:fld id="{66B02B72-AB41-C343-9175-0553C21C4E77}" type="datetimeFigureOut">
               <a:rPr lang="en-US" smtClean="0"/>
-              <a:t>1/3/17</a:t>
+              <a:t>1/4/17</a:t>
             </a:fld>
             <a:endParaRPr lang="en-US"/>
           </a:p>
@@ -2180,7 +2180,7 @@
           <a:p>
             <a:fld id="{66B02B72-AB41-C343-9175-0553C21C4E77}" type="datetimeFigureOut">
               <a:rPr lang="en-US" smtClean="0"/>
-              <a:t>1/3/17</a:t>
+              <a:t>1/4/17</a:t>
             </a:fld>
             <a:endParaRPr lang="en-US"/>
           </a:p>
@@ -2457,7 +2457,7 @@
           <a:p>
             <a:fld id="{66B02B72-AB41-C343-9175-0553C21C4E77}" type="datetimeFigureOut">
               <a:rPr lang="en-US" smtClean="0"/>
-              <a:t>1/3/17</a:t>
+              <a:t>1/4/17</a:t>
             </a:fld>
             <a:endParaRPr lang="en-US"/>
           </a:p>
@@ -2710,7 +2710,7 @@
           <a:p>
             <a:fld id="{66B02B72-AB41-C343-9175-0553C21C4E77}" type="datetimeFigureOut">
               <a:rPr lang="en-US" smtClean="0"/>
-              <a:t>1/3/17</a:t>
+              <a:t>1/4/17</a:t>
             </a:fld>
             <a:endParaRPr lang="en-US"/>
           </a:p>
@@ -2923,7 +2923,7 @@
           <a:p>
             <a:fld id="{66B02B72-AB41-C343-9175-0553C21C4E77}" type="datetimeFigureOut">
               <a:rPr lang="en-US" smtClean="0"/>
-              <a:t>1/3/17</a:t>
+              <a:t>1/4/17</a:t>
             </a:fld>
             <a:endParaRPr lang="en-US"/>
           </a:p>
@@ -18550,7 +18550,7 @@
           <p:nvPr>
             <p:extLst>
               <p:ext uri="{D42A27DB-BD31-4B8C-83A1-F6EECF244321}">
-                <p14:modId xmlns:p14="http://schemas.microsoft.com/office/powerpoint/2010/main" val="1135569770"/>
+                <p14:modId xmlns:p14="http://schemas.microsoft.com/office/powerpoint/2010/main" val="1685480805"/>
               </p:ext>
             </p:extLst>
           </p:nvPr>
@@ -19043,7 +19043,7 @@
           <p:nvPr>
             <p:extLst>
               <p:ext uri="{D42A27DB-BD31-4B8C-83A1-F6EECF244321}">
-                <p14:modId xmlns:p14="http://schemas.microsoft.com/office/powerpoint/2010/main" val="833953501"/>
+                <p14:modId xmlns:p14="http://schemas.microsoft.com/office/powerpoint/2010/main" val="419102058"/>
               </p:ext>
             </p:extLst>
           </p:nvPr>
@@ -19522,7 +19522,7 @@
           <p:nvPr>
             <p:extLst>
               <p:ext uri="{D42A27DB-BD31-4B8C-83A1-F6EECF244321}">
-                <p14:modId xmlns:p14="http://schemas.microsoft.com/office/powerpoint/2010/main" val="1778210985"/>
+                <p14:modId xmlns:p14="http://schemas.microsoft.com/office/powerpoint/2010/main" val="101926646"/>
               </p:ext>
             </p:extLst>
           </p:nvPr>
@@ -19851,7 +19851,7 @@
           <p:nvPr>
             <p:extLst>
               <p:ext uri="{D42A27DB-BD31-4B8C-83A1-F6EECF244321}">
-                <p14:modId xmlns:p14="http://schemas.microsoft.com/office/powerpoint/2010/main" val="2009593243"/>
+                <p14:modId xmlns:p14="http://schemas.microsoft.com/office/powerpoint/2010/main" val="1536672663"/>
               </p:ext>
             </p:extLst>
           </p:nvPr>
@@ -20180,7 +20180,7 @@
           <p:nvPr>
             <p:extLst>
               <p:ext uri="{D42A27DB-BD31-4B8C-83A1-F6EECF244321}">
-                <p14:modId xmlns:p14="http://schemas.microsoft.com/office/powerpoint/2010/main" val="1758318732"/>
+                <p14:modId xmlns:p14="http://schemas.microsoft.com/office/powerpoint/2010/main" val="1219108219"/>
               </p:ext>
             </p:extLst>
           </p:nvPr>
@@ -20361,7 +20361,7 @@
           <p:nvPr>
             <p:extLst>
               <p:ext uri="{D42A27DB-BD31-4B8C-83A1-F6EECF244321}">
-                <p14:modId xmlns:p14="http://schemas.microsoft.com/office/powerpoint/2010/main" val="540462357"/>
+                <p14:modId xmlns:p14="http://schemas.microsoft.com/office/powerpoint/2010/main" val="410360706"/>
               </p:ext>
             </p:extLst>
           </p:nvPr>
@@ -20687,9 +20687,11 @@
                     <a:p>
                       <a:pPr algn="ctr"/>
                       <a:r>
-                        <a:rPr lang="en-US" sz="1000" b="1" i="0" dirty="0" smtClean="0">
+                        <a:rPr lang="en-US" sz="1000" b="0" i="0" dirty="0" smtClean="0">
                           <a:solidFill>
-                            <a:srgbClr val="7030A0"/>
+                            <a:schemeClr val="bg1">
+                              <a:lumMod val="50000"/>
+                            </a:schemeClr>
                           </a:solidFill>
                           <a:latin typeface="Source Sans Pro Light" charset="0"/>
                           <a:ea typeface="Source Sans Pro Light" charset="0"/>
@@ -20698,9 +20700,11 @@
                         <a:t>12:00</a:t>
                       </a:r>
                       <a:r>
-                        <a:rPr lang="en-US" sz="1000" b="1" i="0" baseline="0" dirty="0" smtClean="0">
+                        <a:rPr lang="en-US" sz="1000" b="0" i="0" baseline="0" dirty="0" smtClean="0">
                           <a:solidFill>
-                            <a:srgbClr val="7030A0"/>
+                            <a:schemeClr val="bg1">
+                              <a:lumMod val="50000"/>
+                            </a:schemeClr>
                           </a:solidFill>
                           <a:latin typeface="Source Sans Pro Light" charset="0"/>
                           <a:ea typeface="Source Sans Pro Light" charset="0"/>
@@ -20708,9 +20712,11 @@
                         </a:rPr>
                         <a:t> - 12:10</a:t>
                       </a:r>
-                      <a:endParaRPr lang="en-US" sz="1000" b="1" i="0" dirty="0">
+                      <a:endParaRPr lang="en-US" sz="1000" b="0" i="0" dirty="0">
                         <a:solidFill>
-                          <a:srgbClr val="7030A0"/>
+                          <a:schemeClr val="bg1">
+                            <a:lumMod val="50000"/>
+                          </a:schemeClr>
                         </a:solidFill>
                         <a:latin typeface="Source Sans Pro Light" charset="0"/>
                         <a:ea typeface="Source Sans Pro Light" charset="0"/>
@@ -20746,9 +20752,11 @@
                     <a:p>
                       <a:pPr algn="ctr"/>
                       <a:r>
-                        <a:rPr lang="en-US" sz="1000" b="1" i="0" dirty="0" smtClean="0">
+                        <a:rPr lang="en-US" sz="1000" b="0" i="0" dirty="0" smtClean="0">
                           <a:solidFill>
-                            <a:srgbClr val="7030A0"/>
+                            <a:schemeClr val="bg1">
+                              <a:lumMod val="50000"/>
+                            </a:schemeClr>
                           </a:solidFill>
                           <a:latin typeface="Source Sans Pro Light" charset="0"/>
                           <a:ea typeface="Source Sans Pro Light" charset="0"/>
@@ -20756,9 +20764,11 @@
                         </a:rPr>
                         <a:t>cat</a:t>
                       </a:r>
-                      <a:endParaRPr lang="en-US" sz="1000" b="1" i="0" dirty="0">
+                      <a:endParaRPr lang="en-US" sz="1000" b="0" i="0" dirty="0">
                         <a:solidFill>
-                          <a:srgbClr val="7030A0"/>
+                          <a:schemeClr val="bg1">
+                            <a:lumMod val="50000"/>
+                          </a:schemeClr>
                         </a:solidFill>
                         <a:latin typeface="Source Sans Pro Light" charset="0"/>
                         <a:ea typeface="Source Sans Pro Light" charset="0"/>
@@ -20785,9 +20795,11 @@
                     <a:p>
                       <a:pPr algn="ctr"/>
                       <a:r>
-                        <a:rPr lang="en-US" sz="1000" b="1" i="0" dirty="0" smtClean="0">
+                        <a:rPr lang="en-US" sz="1000" b="0" i="0" dirty="0" smtClean="0">
                           <a:solidFill>
-                            <a:srgbClr val="7030A0"/>
+                            <a:schemeClr val="bg1">
+                              <a:lumMod val="50000"/>
+                            </a:schemeClr>
                           </a:solidFill>
                           <a:latin typeface="Source Sans Pro Light" charset="0"/>
                           <a:ea typeface="Source Sans Pro Light" charset="0"/>
@@ -20795,9 +20807,11 @@
                         </a:rPr>
                         <a:t>1</a:t>
                       </a:r>
-                      <a:endParaRPr lang="en-US" sz="1000" b="1" i="0" dirty="0">
+                      <a:endParaRPr lang="en-US" sz="1000" b="0" i="0" dirty="0">
                         <a:solidFill>
-                          <a:srgbClr val="7030A0"/>
+                          <a:schemeClr val="bg1">
+                            <a:lumMod val="50000"/>
+                          </a:schemeClr>
                         </a:solidFill>
                         <a:latin typeface="Source Sans Pro Light" charset="0"/>
                         <a:ea typeface="Source Sans Pro Light" charset="0"/>
@@ -20840,7 +20854,7 @@
           <p:nvPr>
             <p:extLst>
               <p:ext uri="{D42A27DB-BD31-4B8C-83A1-F6EECF244321}">
-                <p14:modId xmlns:p14="http://schemas.microsoft.com/office/powerpoint/2010/main" val="1842490936"/>
+                <p14:modId xmlns:p14="http://schemas.microsoft.com/office/powerpoint/2010/main" val="1362395225"/>
               </p:ext>
             </p:extLst>
           </p:nvPr>
@@ -21305,7 +21319,7 @@
           <p:nvPr>
             <p:extLst>
               <p:ext uri="{D42A27DB-BD31-4B8C-83A1-F6EECF244321}">
-                <p14:modId xmlns:p14="http://schemas.microsoft.com/office/powerpoint/2010/main" val="30971612"/>
+                <p14:modId xmlns:p14="http://schemas.microsoft.com/office/powerpoint/2010/main" val="1305902261"/>
               </p:ext>
             </p:extLst>
           </p:nvPr>
@@ -21756,7 +21770,7 @@
           <p:nvPr>
             <p:extLst>
               <p:ext uri="{D42A27DB-BD31-4B8C-83A1-F6EECF244321}">
-                <p14:modId xmlns:p14="http://schemas.microsoft.com/office/powerpoint/2010/main" val="848840310"/>
+                <p14:modId xmlns:p14="http://schemas.microsoft.com/office/powerpoint/2010/main" val="1016428287"/>
               </p:ext>
             </p:extLst>
           </p:nvPr>
@@ -22263,7 +22277,7 @@
           <p:nvPr>
             <p:extLst>
               <p:ext uri="{D42A27DB-BD31-4B8C-83A1-F6EECF244321}">
-                <p14:modId xmlns:p14="http://schemas.microsoft.com/office/powerpoint/2010/main" val="725223149"/>
+                <p14:modId xmlns:p14="http://schemas.microsoft.com/office/powerpoint/2010/main" val="2025291371"/>
               </p:ext>
             </p:extLst>
           </p:nvPr>
@@ -22770,7 +22784,7 @@
           <p:nvPr>
             <p:extLst>
               <p:ext uri="{D42A27DB-BD31-4B8C-83A1-F6EECF244321}">
-                <p14:modId xmlns:p14="http://schemas.microsoft.com/office/powerpoint/2010/main" val="1855768518"/>
+                <p14:modId xmlns:p14="http://schemas.microsoft.com/office/powerpoint/2010/main" val="1456267447"/>
               </p:ext>
             </p:extLst>
           </p:nvPr>
@@ -23582,7 +23596,7 @@
           <p:nvPr>
             <p:extLst>
               <p:ext uri="{D42A27DB-BD31-4B8C-83A1-F6EECF244321}">
-                <p14:modId xmlns:p14="http://schemas.microsoft.com/office/powerpoint/2010/main" val="1996476645"/>
+                <p14:modId xmlns:p14="http://schemas.microsoft.com/office/powerpoint/2010/main" val="615856870"/>
               </p:ext>
             </p:extLst>
           </p:nvPr>
@@ -23687,7 +23701,7 @@
           <p:nvPr>
             <p:extLst>
               <p:ext uri="{D42A27DB-BD31-4B8C-83A1-F6EECF244321}">
-                <p14:modId xmlns:p14="http://schemas.microsoft.com/office/powerpoint/2010/main" val="350988140"/>
+                <p14:modId xmlns:p14="http://schemas.microsoft.com/office/powerpoint/2010/main" val="1982719197"/>
               </p:ext>
             </p:extLst>
           </p:nvPr>

</xml_diff>

<commit_message>
Reflect review comment on figure
</commit_message>
<xml_diff>
--- a/docs/img/structured-streaming.pptx
+++ b/docs/img/structured-streaming.pptx
@@ -30676,6 +30676,174 @@
           </a:p>
         </p:txBody>
       </p:sp>
+      <p:cxnSp>
+        <p:nvCxnSpPr>
+          <p:cNvPr id="64" name="Shape 138">
+            <a:extLst>
+              <a:ext uri="{FF2B5EF4-FFF2-40B4-BE49-F238E27FC236}">
+                <a16:creationId xmlns:a16="http://schemas.microsoft.com/office/drawing/2014/main" id="{80F415E1-7A02-E04D-9C7E-5AADB08C3F3C}"/>
+              </a:ext>
+            </a:extLst>
+          </p:cNvPr>
+          <p:cNvCxnSpPr>
+            <a:cxnSpLocks/>
+          </p:cNvCxnSpPr>
+          <p:nvPr/>
+        </p:nvCxnSpPr>
+        <p:spPr>
+          <a:xfrm flipV="1">
+            <a:off x="6480486" y="5729578"/>
+            <a:ext cx="0" cy="356688"/>
+          </a:xfrm>
+          <a:prstGeom prst="straightConnector1">
+            <a:avLst/>
+          </a:prstGeom>
+          <a:noFill/>
+          <a:ln w="19050" cap="flat" cmpd="sng">
+            <a:solidFill>
+              <a:schemeClr val="bg1">
+                <a:lumMod val="65000"/>
+              </a:schemeClr>
+            </a:solidFill>
+            <a:prstDash val="lgDash"/>
+            <a:round/>
+            <a:headEnd type="none" w="lg" len="lg"/>
+            <a:tailEnd type="stealth" w="lg" len="lg"/>
+          </a:ln>
+        </p:spPr>
+      </p:cxnSp>
+      <p:sp>
+        <p:nvSpPr>
+          <p:cNvPr id="69" name="Shape 127">
+            <a:extLst>
+              <a:ext uri="{FF2B5EF4-FFF2-40B4-BE49-F238E27FC236}">
+                <a16:creationId xmlns:a16="http://schemas.microsoft.com/office/drawing/2014/main" id="{859448FD-11C3-5442-9901-E54FF799AF4B}"/>
+              </a:ext>
+            </a:extLst>
+          </p:cNvPr>
+          <p:cNvSpPr txBox="1"/>
+          <p:nvPr/>
+        </p:nvSpPr>
+        <p:spPr>
+          <a:xfrm>
+            <a:off x="4957464" y="6097152"/>
+            <a:ext cx="3046045" cy="369325"/>
+          </a:xfrm>
+          <a:prstGeom prst="rect">
+            <a:avLst/>
+          </a:prstGeom>
+          <a:noFill/>
+          <a:ln>
+            <a:noFill/>
+          </a:ln>
+        </p:spPr>
+        <p:txBody>
+          <a:bodyPr lIns="91425" tIns="91425" rIns="91425" bIns="91425" anchor="t" anchorCtr="0">
+            <a:noAutofit/>
+          </a:bodyPr>
+          <a:lstStyle/>
+          <a:p>
+            <a:pPr lvl="0" rtl="0">
+              <a:spcBef>
+                <a:spcPts val="0"/>
+              </a:spcBef>
+              <a:buNone/>
+            </a:pPr>
+            <a:r>
+              <a:rPr lang="en" sz="1400" dirty="0">
+                <a:latin typeface="Source Sans Pro Light" charset="0"/>
+                <a:ea typeface="Source Sans Pro Light" charset="0"/>
+                <a:cs typeface="Source Sans Pro Light" charset="0"/>
+              </a:rPr>
+              <a:t>Session closed at 12:09 + 5 mins = 12:14</a:t>
+            </a:r>
+          </a:p>
+        </p:txBody>
+      </p:sp>
+      <p:cxnSp>
+        <p:nvCxnSpPr>
+          <p:cNvPr id="70" name="Shape 138">
+            <a:extLst>
+              <a:ext uri="{FF2B5EF4-FFF2-40B4-BE49-F238E27FC236}">
+                <a16:creationId xmlns:a16="http://schemas.microsoft.com/office/drawing/2014/main" id="{315D9F5F-4485-564A-8E50-971D38F2FDA1}"/>
+              </a:ext>
+            </a:extLst>
+          </p:cNvPr>
+          <p:cNvCxnSpPr>
+            <a:cxnSpLocks/>
+          </p:cNvCxnSpPr>
+          <p:nvPr/>
+        </p:nvCxnSpPr>
+        <p:spPr>
+          <a:xfrm flipV="1">
+            <a:off x="8866514" y="5473135"/>
+            <a:ext cx="0" cy="599674"/>
+          </a:xfrm>
+          <a:prstGeom prst="straightConnector1">
+            <a:avLst/>
+          </a:prstGeom>
+          <a:noFill/>
+          <a:ln w="19050" cap="flat" cmpd="sng">
+            <a:solidFill>
+              <a:schemeClr val="bg1">
+                <a:lumMod val="65000"/>
+              </a:schemeClr>
+            </a:solidFill>
+            <a:prstDash val="lgDash"/>
+            <a:round/>
+            <a:headEnd type="none" w="lg" len="lg"/>
+            <a:tailEnd type="stealth" w="lg" len="lg"/>
+          </a:ln>
+        </p:spPr>
+      </p:cxnSp>
+      <p:sp>
+        <p:nvSpPr>
+          <p:cNvPr id="71" name="Shape 127">
+            <a:extLst>
+              <a:ext uri="{FF2B5EF4-FFF2-40B4-BE49-F238E27FC236}">
+                <a16:creationId xmlns:a16="http://schemas.microsoft.com/office/drawing/2014/main" id="{913FF214-5930-6F49-963A-A1C6067CD199}"/>
+              </a:ext>
+            </a:extLst>
+          </p:cNvPr>
+          <p:cNvSpPr txBox="1"/>
+          <p:nvPr/>
+        </p:nvSpPr>
+        <p:spPr>
+          <a:xfrm>
+            <a:off x="8003509" y="6098216"/>
+            <a:ext cx="3046045" cy="335750"/>
+          </a:xfrm>
+          <a:prstGeom prst="rect">
+            <a:avLst/>
+          </a:prstGeom>
+          <a:noFill/>
+          <a:ln>
+            <a:noFill/>
+          </a:ln>
+        </p:spPr>
+        <p:txBody>
+          <a:bodyPr lIns="91425" tIns="91425" rIns="91425" bIns="91425" anchor="t" anchorCtr="0">
+            <a:noAutofit/>
+          </a:bodyPr>
+          <a:lstStyle/>
+          <a:p>
+            <a:pPr lvl="0" rtl="0">
+              <a:spcBef>
+                <a:spcPts val="0"/>
+              </a:spcBef>
+              <a:buNone/>
+            </a:pPr>
+            <a:r>
+              <a:rPr lang="en" sz="1400" dirty="0">
+                <a:latin typeface="Source Sans Pro Light" charset="0"/>
+                <a:ea typeface="Source Sans Pro Light" charset="0"/>
+                <a:cs typeface="Source Sans Pro Light" charset="0"/>
+              </a:rPr>
+              <a:t>Session closed at 12:15 + 5 mins = 12:20</a:t>
+            </a:r>
+          </a:p>
+        </p:txBody>
+      </p:sp>
     </p:spTree>
     <p:extLst>
       <p:ext uri="{BB962C8B-B14F-4D97-AF65-F5344CB8AC3E}">

</xml_diff>